<commit_message>
bold and green sql
</commit_message>
<xml_diff>
--- a/presentation DBM1.pptx
+++ b/presentation DBM1.pptx
@@ -861,7 +861,7 @@
           <a:lstStyle/>
           <a:p>
             <a:fld id="{86CB4B4D-7CA3-9044-876B-883B54F8677D}" type="slidenum">
-              <a:t>‹Nr.›</a:t>
+              <a:t>‹#›</a:t>
             </a:fld>
             <a:endParaRPr/>
           </a:p>
@@ -996,7 +996,7 @@
           <a:lstStyle/>
           <a:p>
             <a:fld id="{86CB4B4D-7CA3-9044-876B-883B54F8677D}" type="slidenum">
-              <a:t>‹Nr.›</a:t>
+              <a:t>‹#›</a:t>
             </a:fld>
             <a:endParaRPr/>
           </a:p>
@@ -1077,7 +1077,7 @@
           <a:lstStyle/>
           <a:p>
             <a:fld id="{86CB4B4D-7CA3-9044-876B-883B54F8677D}" type="slidenum">
-              <a:t>‹Nr.›</a:t>
+              <a:t>‹#›</a:t>
             </a:fld>
             <a:endParaRPr/>
           </a:p>
@@ -1129,7 +1129,7 @@
           <a:lstStyle/>
           <a:p>
             <a:fld id="{86CB4B4D-7CA3-9044-876B-883B54F8677D}" type="slidenum">
-              <a:t>‹Nr.›</a:t>
+              <a:t>‹#›</a:t>
             </a:fld>
             <a:endParaRPr/>
           </a:p>
@@ -1561,7 +1561,7 @@
           <a:lstStyle/>
           <a:p>
             <a:fld id="{86CB4B4D-7CA3-9044-876B-883B54F8677D}" type="slidenum">
-              <a:t>‹Nr.›</a:t>
+              <a:t>‹#›</a:t>
             </a:fld>
             <a:endParaRPr/>
           </a:p>
@@ -1642,7 +1642,7 @@
           <a:lstStyle/>
           <a:p>
             <a:fld id="{86CB4B4D-7CA3-9044-876B-883B54F8677D}" type="slidenum">
-              <a:t>‹Nr.›</a:t>
+              <a:t>‹#›</a:t>
             </a:fld>
             <a:endParaRPr/>
           </a:p>
@@ -1992,7 +1992,7 @@
           <a:lstStyle/>
           <a:p>
             <a:fld id="{86CB4B4D-7CA3-9044-876B-883B54F8677D}" type="slidenum">
-              <a:t>‹Nr.›</a:t>
+              <a:t>‹#›</a:t>
             </a:fld>
             <a:endParaRPr/>
           </a:p>
@@ -2069,7 +2069,7 @@
           <a:lstStyle/>
           <a:p>
             <a:fld id="{86CB4B4D-7CA3-9044-876B-883B54F8677D}" type="slidenum">
-              <a:t>‹Nr.›</a:t>
+              <a:t>‹#›</a:t>
             </a:fld>
             <a:endParaRPr/>
           </a:p>
@@ -4655,7 +4655,7 @@
           <a:lstStyle/>
           <a:p>
             <a:fld id="{86CB4B4D-7CA3-9044-876B-883B54F8677D}" type="slidenum">
-              <a:t>‹Nr.›</a:t>
+              <a:t>‹#›</a:t>
             </a:fld>
             <a:endParaRPr/>
           </a:p>
@@ -4803,7 +4803,7 @@
           <a:lstStyle/>
           <a:p>
             <a:fld id="{86CB4B4D-7CA3-9044-876B-883B54F8677D}" type="slidenum">
-              <a:t>‹Nr.›</a:t>
+              <a:t>‹#›</a:t>
             </a:fld>
             <a:endParaRPr/>
           </a:p>
@@ -4954,7 +4954,7 @@
           </a:ln>
           <a:extLst>
             <a:ext uri="{C572A759-6A51-4108-AA02-DFA0A04FC94B}">
-              <ma14:wrappingTextBoxFlag xmlns:ma14="http://schemas.microsoft.com/office/mac/drawingml/2011/main" xmlns:a14="http://schemas.microsoft.com/office/drawing/2010/main" xmlns:m="http://schemas.openxmlformats.org/officeDocument/2006/math" xmlns="" val="1"/>
+              <ma14:wrappingTextBoxFlag xmlns="" xmlns:m="http://schemas.openxmlformats.org/officeDocument/2006/math" xmlns:a14="http://schemas.microsoft.com/office/drawing/2010/main" xmlns:ma14="http://schemas.microsoft.com/office/mac/drawingml/2011/main" val="1"/>
             </a:ext>
           </a:extLst>
         </p:spPr>
@@ -4993,7 +4993,7 @@
           </a:ln>
           <a:extLst>
             <a:ext uri="{C572A759-6A51-4108-AA02-DFA0A04FC94B}">
-              <ma14:wrappingTextBoxFlag xmlns:ma14="http://schemas.microsoft.com/office/mac/drawingml/2011/main" xmlns:a14="http://schemas.microsoft.com/office/drawing/2010/main" xmlns:m="http://schemas.openxmlformats.org/officeDocument/2006/math" xmlns="" val="1"/>
+              <ma14:wrappingTextBoxFlag xmlns="" xmlns:m="http://schemas.openxmlformats.org/officeDocument/2006/math" xmlns:a14="http://schemas.microsoft.com/office/drawing/2010/main" xmlns:ma14="http://schemas.microsoft.com/office/mac/drawingml/2011/main" val="1"/>
             </a:ext>
           </a:extLst>
         </p:spPr>
@@ -5070,7 +5070,7 @@
           </a:lstStyle>
           <a:p>
             <a:fld id="{86CB4B4D-7CA3-9044-876B-883B54F8677D}" type="slidenum">
-              <a:t>‹Nr.›</a:t>
+              <a:t>‹#›</a:t>
             </a:fld>
             <a:endParaRPr/>
           </a:p>
@@ -5953,7 +5953,43 @@
           </a:lstStyle>
           <a:p>
             <a:r>
-              <a:t>Formula 1 race data from 1950 to 2022</a:t>
+              <a:rPr dirty="0"/>
+              <a:t>Formula 1 </a:t>
+            </a:r>
+            <a:r>
+              <a:rPr lang="en-IE" dirty="0"/>
+              <a:t>R</a:t>
+            </a:r>
+            <a:r>
+              <a:rPr dirty="0"/>
+              <a:t>ace </a:t>
+            </a:r>
+            <a:r>
+              <a:rPr lang="en-IE" dirty="0"/>
+              <a:t>D</a:t>
+            </a:r>
+            <a:r>
+              <a:rPr dirty="0" err="1"/>
+              <a:t>ata</a:t>
+            </a:r>
+            <a:r>
+              <a:rPr dirty="0"/>
+              <a:t> </a:t>
+            </a:r>
+            <a:br>
+              <a:rPr lang="en-IE" dirty="0"/>
+            </a:br>
+            <a:r>
+              <a:rPr dirty="0"/>
+              <a:t>1950 </a:t>
+            </a:r>
+            <a:r>
+              <a:rPr lang="en-IE" dirty="0"/>
+              <a:t>-</a:t>
+            </a:r>
+            <a:r>
+              <a:rPr dirty="0"/>
+              <a:t> 2022</a:t>
             </a:r>
           </a:p>
         </p:txBody>
@@ -6070,7 +6106,7 @@
             </a:r>
             <a:r>
               <a:rPr lang="en-IE" dirty="0"/>
-              <a:t>one</a:t>
+              <a:t>One</a:t>
             </a:r>
             <a:r>
               <a:rPr lang="de-DE" dirty="0"/>
@@ -6080,8 +6116,22 @@
           <a:p>
             <a:pPr lvl="1"/>
             <a:r>
+              <a:rPr lang="de-DE" dirty="0"/>
+              <a:t>Drivers and Constructors</a:t>
+            </a:r>
+          </a:p>
+          <a:p>
+            <a:pPr lvl="1"/>
+            <a:r>
+              <a:rPr lang="de-DE" dirty="0"/>
+              <a:t>Circuits</a:t>
+            </a:r>
+          </a:p>
+          <a:p>
+            <a:pPr lvl="1"/>
+            <a:r>
               <a:rPr lang="de-DE" dirty="0" err="1"/>
-              <a:t>Circuits</a:t>
+              <a:t>Races</a:t>
             </a:r>
             <a:endParaRPr lang="de-DE" dirty="0"/>
           </a:p>
@@ -6089,78 +6139,34 @@
             <a:pPr lvl="1"/>
             <a:r>
               <a:rPr lang="de-DE" dirty="0" err="1"/>
-              <a:t>Races</a:t>
-            </a:r>
-            <a:endParaRPr lang="de-DE" dirty="0"/>
+              <a:t>Results</a:t>
+            </a:r>
+            <a:r>
+              <a:rPr lang="de-DE" dirty="0"/>
+              <a:t> (</a:t>
+            </a:r>
+            <a:r>
+              <a:rPr lang="de-DE" dirty="0" err="1"/>
+              <a:t>drivers</a:t>
+            </a:r>
+            <a:r>
+              <a:rPr lang="de-DE" dirty="0"/>
+              <a:t> and </a:t>
+            </a:r>
+            <a:r>
+              <a:rPr lang="de-DE" dirty="0" err="1"/>
+              <a:t>constructors</a:t>
+            </a:r>
+            <a:r>
+              <a:rPr lang="de-DE" dirty="0"/>
+              <a:t>)</a:t>
+            </a:r>
           </a:p>
           <a:p>
             <a:pPr lvl="1"/>
             <a:r>
-              <a:rPr lang="de-DE" dirty="0" err="1"/>
-              <a:t>Results</a:t>
-            </a:r>
-            <a:r>
               <a:rPr lang="de-DE" dirty="0"/>
-              <a:t> (</a:t>
-            </a:r>
-            <a:r>
-              <a:rPr lang="de-DE" dirty="0" err="1"/>
-              <a:t>drivers</a:t>
-            </a:r>
-            <a:r>
-              <a:rPr lang="de-DE" dirty="0"/>
-              <a:t> and </a:t>
-            </a:r>
-            <a:r>
-              <a:rPr lang="de-DE" dirty="0" err="1"/>
-              <a:t>constructors</a:t>
-            </a:r>
-            <a:r>
-              <a:rPr lang="de-DE" dirty="0"/>
-              <a:t>)</a:t>
-            </a:r>
-          </a:p>
-          <a:p>
-            <a:pPr lvl="1"/>
-            <a:r>
-              <a:rPr lang="de-DE" dirty="0"/>
-              <a:t>Sprints, </a:t>
-            </a:r>
-            <a:r>
-              <a:rPr lang="de-DE" dirty="0" err="1"/>
-              <a:t>lap</a:t>
-            </a:r>
-            <a:r>
-              <a:rPr lang="de-DE" dirty="0"/>
-              <a:t> </a:t>
-            </a:r>
-            <a:r>
-              <a:rPr lang="de-DE" dirty="0" err="1"/>
-              <a:t>times</a:t>
-            </a:r>
-            <a:r>
-              <a:rPr lang="de-DE" dirty="0"/>
-              <a:t>, </a:t>
-            </a:r>
-            <a:r>
-              <a:rPr lang="de-DE" dirty="0" err="1"/>
-              <a:t>qualifying</a:t>
-            </a:r>
-            <a:r>
-              <a:rPr lang="de-DE" dirty="0"/>
-              <a:t>, </a:t>
-            </a:r>
-            <a:r>
-              <a:rPr lang="de-DE" dirty="0" err="1"/>
-              <a:t>pit</a:t>
-            </a:r>
-            <a:r>
-              <a:rPr lang="de-DE" dirty="0"/>
-              <a:t> </a:t>
-            </a:r>
-            <a:r>
-              <a:rPr lang="de-DE" dirty="0" err="1"/>
-              <a:t>stops</a:t>
+              <a:t>Sprints, Lap Times, Qualifying, Pit Stops</a:t>
             </a:r>
             <a:endParaRPr dirty="0"/>
           </a:p>
@@ -6432,28 +6438,221 @@
                             </p:stCondLst>
                             <p:childTnLst>
                               <p:par>
-                                <p:cTn id="5" presetID="10" presetClass="exit" presetSubtype="0" repeatCount="0" fill="hold" nodeType="clickEffect">
+                                <p:cTn id="5" presetID="1" presetClass="entr" presetSubtype="0" fill="hold" grpId="0" nodeType="clickEffect">
                                   <p:stCondLst>
                                     <p:cond delay="0"/>
                                   </p:stCondLst>
                                   <p:childTnLst>
-                                    <p:animEffect transition="out" filter="fade">
+                                    <p:set>
                                       <p:cBhvr>
-                                        <p:cTn id="6" dur="2000"/>
+                                        <p:cTn id="6" dur="1" fill="hold">
+                                          <p:stCondLst>
+                                            <p:cond delay="0"/>
+                                          </p:stCondLst>
+                                        </p:cTn>
+                                        <p:tgtEl>
+                                          <p:spTgt spid="143"/>
+                                        </p:tgtEl>
+                                        <p:attrNameLst>
+                                          <p:attrName>style.visibility</p:attrName>
+                                        </p:attrNameLst>
+                                      </p:cBhvr>
+                                      <p:to>
+                                        <p:strVal val="visible"/>
+                                      </p:to>
+                                    </p:set>
+                                  </p:childTnLst>
+                                </p:cTn>
+                              </p:par>
+                              <p:par>
+                                <p:cTn id="7" presetID="1" presetClass="entr" presetSubtype="0" fill="hold" nodeType="withEffect">
+                                  <p:stCondLst>
+                                    <p:cond delay="0"/>
+                                  </p:stCondLst>
+                                  <p:childTnLst>
+                                    <p:set>
+                                      <p:cBhvr>
+                                        <p:cTn id="8" dur="1" fill="hold">
+                                          <p:stCondLst>
+                                            <p:cond delay="0"/>
+                                          </p:stCondLst>
+                                        </p:cTn>
                                         <p:tgtEl>
                                           <p:spTgt spid="143">
                                             <p:txEl>
-                                              <p:pRg st="4" end="4"/>
+                                              <p:pRg st="0" end="0"/>
                                             </p:txEl>
                                           </p:spTgt>
                                         </p:tgtEl>
+                                        <p:attrNameLst>
+                                          <p:attrName>style.visibility</p:attrName>
+                                        </p:attrNameLst>
                                       </p:cBhvr>
-                                    </p:animEffect>
+                                      <p:to>
+                                        <p:strVal val="visible"/>
+                                      </p:to>
+                                    </p:set>
+                                  </p:childTnLst>
+                                </p:cTn>
+                              </p:par>
+                              <p:par>
+                                <p:cTn id="9" presetID="1" presetClass="entr" presetSubtype="0" fill="hold" nodeType="withEffect">
+                                  <p:stCondLst>
+                                    <p:cond delay="0"/>
+                                  </p:stCondLst>
+                                  <p:childTnLst>
                                     <p:set>
                                       <p:cBhvr>
-                                        <p:cTn id="7" dur="1" fill="hold">
+                                        <p:cTn id="10" dur="1" fill="hold">
                                           <p:stCondLst>
-                                            <p:cond delay="1999"/>
+                                            <p:cond delay="0"/>
+                                          </p:stCondLst>
+                                        </p:cTn>
+                                        <p:tgtEl>
+                                          <p:spTgt spid="143">
+                                            <p:txEl>
+                                              <p:pRg st="1" end="1"/>
+                                            </p:txEl>
+                                          </p:spTgt>
+                                        </p:tgtEl>
+                                        <p:attrNameLst>
+                                          <p:attrName>style.visibility</p:attrName>
+                                        </p:attrNameLst>
+                                      </p:cBhvr>
+                                      <p:to>
+                                        <p:strVal val="visible"/>
+                                      </p:to>
+                                    </p:set>
+                                  </p:childTnLst>
+                                </p:cTn>
+                              </p:par>
+                            </p:childTnLst>
+                          </p:cTn>
+                        </p:par>
+                      </p:childTnLst>
+                    </p:cTn>
+                  </p:par>
+                  <p:par>
+                    <p:cTn id="11" fill="hold">
+                      <p:stCondLst>
+                        <p:cond delay="indefinite"/>
+                      </p:stCondLst>
+                      <p:childTnLst>
+                        <p:par>
+                          <p:cTn id="12" fill="hold">
+                            <p:stCondLst>
+                              <p:cond delay="0"/>
+                            </p:stCondLst>
+                            <p:childTnLst>
+                              <p:par>
+                                <p:cTn id="13" presetID="1" presetClass="entr" presetSubtype="0" fill="hold" nodeType="clickEffect">
+                                  <p:stCondLst>
+                                    <p:cond delay="0"/>
+                                  </p:stCondLst>
+                                  <p:childTnLst>
+                                    <p:set>
+                                      <p:cBhvr>
+                                        <p:cTn id="14" dur="1" fill="hold">
+                                          <p:stCondLst>
+                                            <p:cond delay="0"/>
+                                          </p:stCondLst>
+                                        </p:cTn>
+                                        <p:tgtEl>
+                                          <p:spTgt spid="143">
+                                            <p:txEl>
+                                              <p:pRg st="2" end="2"/>
+                                            </p:txEl>
+                                          </p:spTgt>
+                                        </p:tgtEl>
+                                        <p:attrNameLst>
+                                          <p:attrName>style.visibility</p:attrName>
+                                        </p:attrNameLst>
+                                      </p:cBhvr>
+                                      <p:to>
+                                        <p:strVal val="visible"/>
+                                      </p:to>
+                                    </p:set>
+                                  </p:childTnLst>
+                                </p:cTn>
+                              </p:par>
+                            </p:childTnLst>
+                          </p:cTn>
+                        </p:par>
+                      </p:childTnLst>
+                    </p:cTn>
+                  </p:par>
+                  <p:par>
+                    <p:cTn id="15" fill="hold">
+                      <p:stCondLst>
+                        <p:cond delay="indefinite"/>
+                      </p:stCondLst>
+                      <p:childTnLst>
+                        <p:par>
+                          <p:cTn id="16" fill="hold">
+                            <p:stCondLst>
+                              <p:cond delay="0"/>
+                            </p:stCondLst>
+                            <p:childTnLst>
+                              <p:par>
+                                <p:cTn id="17" presetID="1" presetClass="entr" presetSubtype="0" fill="hold" nodeType="clickEffect">
+                                  <p:stCondLst>
+                                    <p:cond delay="0"/>
+                                  </p:stCondLst>
+                                  <p:childTnLst>
+                                    <p:set>
+                                      <p:cBhvr>
+                                        <p:cTn id="18" dur="1" fill="hold">
+                                          <p:stCondLst>
+                                            <p:cond delay="0"/>
+                                          </p:stCondLst>
+                                        </p:cTn>
+                                        <p:tgtEl>
+                                          <p:spTgt spid="143">
+                                            <p:txEl>
+                                              <p:pRg st="3" end="3"/>
+                                            </p:txEl>
+                                          </p:spTgt>
+                                        </p:tgtEl>
+                                        <p:attrNameLst>
+                                          <p:attrName>style.visibility</p:attrName>
+                                        </p:attrNameLst>
+                                      </p:cBhvr>
+                                      <p:to>
+                                        <p:strVal val="visible"/>
+                                      </p:to>
+                                    </p:set>
+                                  </p:childTnLst>
+                                </p:cTn>
+                              </p:par>
+                            </p:childTnLst>
+                          </p:cTn>
+                        </p:par>
+                      </p:childTnLst>
+                    </p:cTn>
+                  </p:par>
+                  <p:par>
+                    <p:cTn id="19" fill="hold">
+                      <p:stCondLst>
+                        <p:cond delay="indefinite"/>
+                      </p:stCondLst>
+                      <p:childTnLst>
+                        <p:par>
+                          <p:cTn id="20" fill="hold">
+                            <p:stCondLst>
+                              <p:cond delay="0"/>
+                            </p:stCondLst>
+                            <p:childTnLst>
+                              <p:par>
+                                <p:cTn id="21" presetID="1" presetClass="entr" presetSubtype="0" fill="hold" nodeType="clickEffect">
+                                  <p:stCondLst>
+                                    <p:cond delay="0"/>
+                                  </p:stCondLst>
+                                  <p:childTnLst>
+                                    <p:set>
+                                      <p:cBhvr>
+                                        <p:cTn id="22" dur="1" fill="hold">
+                                          <p:stCondLst>
+                                            <p:cond delay="0"/>
                                           </p:stCondLst>
                                         </p:cTn>
                                         <p:tgtEl>
@@ -6468,7 +6667,56 @@
                                         </p:attrNameLst>
                                       </p:cBhvr>
                                       <p:to>
-                                        <p:strVal val="hidden"/>
+                                        <p:strVal val="visible"/>
+                                      </p:to>
+                                    </p:set>
+                                  </p:childTnLst>
+                                </p:cTn>
+                              </p:par>
+                            </p:childTnLst>
+                          </p:cTn>
+                        </p:par>
+                      </p:childTnLst>
+                    </p:cTn>
+                  </p:par>
+                  <p:par>
+                    <p:cTn id="23" fill="hold">
+                      <p:stCondLst>
+                        <p:cond delay="indefinite"/>
+                      </p:stCondLst>
+                      <p:childTnLst>
+                        <p:par>
+                          <p:cTn id="24" fill="hold">
+                            <p:stCondLst>
+                              <p:cond delay="0"/>
+                            </p:stCondLst>
+                            <p:childTnLst>
+                              <p:par>
+                                <p:cTn id="25" presetID="1" presetClass="entr" presetSubtype="0" fill="hold" nodeType="clickEffect">
+                                  <p:stCondLst>
+                                    <p:cond delay="0"/>
+                                  </p:stCondLst>
+                                  <p:childTnLst>
+                                    <p:set>
+                                      <p:cBhvr>
+                                        <p:cTn id="26" dur="1" fill="hold">
+                                          <p:stCondLst>
+                                            <p:cond delay="0"/>
+                                          </p:stCondLst>
+                                        </p:cTn>
+                                        <p:tgtEl>
+                                          <p:spTgt spid="143">
+                                            <p:txEl>
+                                              <p:pRg st="5" end="5"/>
+                                            </p:txEl>
+                                          </p:spTgt>
+                                        </p:tgtEl>
+                                        <p:attrNameLst>
+                                          <p:attrName>style.visibility</p:attrName>
+                                        </p:attrNameLst>
+                                      </p:cBhvr>
+                                      <p:to>
+                                        <p:strVal val="visible"/>
                                       </p:to>
                                     </p:set>
                                   </p:childTnLst>
@@ -6501,6 +6749,9 @@
         </p:cTn>
       </p:par>
     </p:tnLst>
+    <p:bldLst>
+      <p:bldP spid="143" grpId="0" uiExpand="1" animBg="1"/>
+    </p:bldLst>
   </p:timing>
 </p:sld>
 </file>
@@ -7890,8 +8141,8 @@
         </p:nvSpPr>
         <p:spPr>
           <a:xfrm>
-            <a:off x="4510087" y="6858000"/>
-            <a:ext cx="16563976" cy="1512912"/>
+            <a:off x="2961254" y="6706152"/>
+            <a:ext cx="18461492" cy="1512912"/>
           </a:xfrm>
           <a:effectLst>
             <a:reflection stA="45000" endPos="0" dist="50800" dir="5400000" sy="-100000" algn="bl" rotWithShape="0"/>
@@ -7899,11 +8150,11 @@
         </p:spPr>
         <p:txBody>
           <a:bodyPr>
-            <a:normAutofit/>
+            <a:normAutofit fontScale="92500"/>
           </a:bodyPr>
           <a:lstStyle/>
           <a:p>
-            <a:pPr marL="0" indent="0">
+            <a:pPr marL="0" indent="0" algn="ctr">
               <a:buNone/>
             </a:pPr>
             <a:r>
@@ -7912,87 +8163,7 @@
                   <a:srgbClr val="D93E2F"/>
                 </a:solidFill>
               </a:rPr>
-              <a:t> Seasons </a:t>
-            </a:r>
-            <a:r>
-              <a:rPr lang="de-DE" sz="6000" dirty="0" err="1">
-                <a:solidFill>
-                  <a:srgbClr val="D93E2F"/>
-                </a:solidFill>
-              </a:rPr>
-              <a:t>with</a:t>
-            </a:r>
-            <a:r>
-              <a:rPr lang="de-DE" sz="6000" dirty="0">
-                <a:solidFill>
-                  <a:srgbClr val="D93E2F"/>
-                </a:solidFill>
-              </a:rPr>
-              <a:t> </a:t>
-            </a:r>
-            <a:r>
-              <a:rPr lang="de-DE" sz="6000" dirty="0" err="1">
-                <a:solidFill>
-                  <a:srgbClr val="D93E2F"/>
-                </a:solidFill>
-              </a:rPr>
-              <a:t>the</a:t>
-            </a:r>
-            <a:r>
-              <a:rPr lang="de-DE" sz="6000" dirty="0">
-                <a:solidFill>
-                  <a:srgbClr val="D93E2F"/>
-                </a:solidFill>
-              </a:rPr>
-              <a:t> </a:t>
-            </a:r>
-            <a:r>
-              <a:rPr lang="de-DE" sz="6000" dirty="0" err="1">
-                <a:solidFill>
-                  <a:srgbClr val="D93E2F"/>
-                </a:solidFill>
-              </a:rPr>
-              <a:t>most</a:t>
-            </a:r>
-            <a:r>
-              <a:rPr lang="de-DE" sz="6000" dirty="0">
-                <a:solidFill>
-                  <a:srgbClr val="D93E2F"/>
-                </a:solidFill>
-              </a:rPr>
-              <a:t> </a:t>
-            </a:r>
-            <a:r>
-              <a:rPr lang="de-DE" sz="6000" dirty="0" err="1">
-                <a:solidFill>
-                  <a:srgbClr val="D93E2F"/>
-                </a:solidFill>
-              </a:rPr>
-              <a:t>collisions</a:t>
-            </a:r>
-            <a:r>
-              <a:rPr lang="de-DE" sz="6000" dirty="0">
-                <a:solidFill>
-                  <a:srgbClr val="D93E2F"/>
-                </a:solidFill>
-              </a:rPr>
-              <a:t> </a:t>
-            </a:r>
-            <a:r>
-              <a:rPr lang="de-DE" sz="6000" dirty="0" err="1">
-                <a:solidFill>
-                  <a:srgbClr val="D93E2F"/>
-                </a:solidFill>
-              </a:rPr>
-              <a:t>over</a:t>
-            </a:r>
-            <a:r>
-              <a:rPr lang="de-DE" sz="6000" dirty="0">
-                <a:solidFill>
-                  <a:srgbClr val="D93E2F"/>
-                </a:solidFill>
-              </a:rPr>
-              <a:t> 500m</a:t>
+              <a:t> Seasons with the most collisions at an altitude over 500m</a:t>
             </a:r>
           </a:p>
         </p:txBody>
@@ -8060,10 +8231,19 @@
               <a:tabLst/>
             </a:pPr>
             <a:r>
+              <a:rPr lang="en-IE" b="1" dirty="0">
+                <a:solidFill>
+                  <a:srgbClr val="00B050"/>
+                </a:solidFill>
+                <a:latin typeface="Consolas" panose="020B0609020204030204" pitchFamily="49" charset="0"/>
+              </a:rPr>
+              <a:t>SELECT</a:t>
+            </a:r>
+            <a:r>
               <a:rPr lang="en-IE" dirty="0">
                 <a:latin typeface="Consolas" panose="020B0609020204030204" pitchFamily="49" charset="0"/>
               </a:rPr>
-              <a:t>SELECT </a:t>
+              <a:t> </a:t>
             </a:r>
             <a:r>
               <a:rPr lang="en-IE" dirty="0" err="1">
@@ -8075,7 +8255,37 @@
               <a:rPr lang="en-IE" dirty="0">
                 <a:latin typeface="Consolas" panose="020B0609020204030204" pitchFamily="49" charset="0"/>
               </a:rPr>
-              <a:t>, COUNT(*) FROM races</a:t>
+              <a:t>, </a:t>
+            </a:r>
+            <a:r>
+              <a:rPr lang="en-IE" b="1" dirty="0">
+                <a:solidFill>
+                  <a:srgbClr val="00B050"/>
+                </a:solidFill>
+                <a:latin typeface="Consolas" panose="020B0609020204030204" pitchFamily="49" charset="0"/>
+              </a:rPr>
+              <a:t>COUNT</a:t>
+            </a:r>
+            <a:r>
+              <a:rPr lang="en-IE" dirty="0">
+                <a:latin typeface="Consolas" panose="020B0609020204030204" pitchFamily="49" charset="0"/>
+              </a:rPr>
+              <a:t>(*) </a:t>
+            </a:r>
+            <a:r>
+              <a:rPr lang="en-IE" b="1" dirty="0">
+                <a:solidFill>
+                  <a:srgbClr val="00B050"/>
+                </a:solidFill>
+                <a:latin typeface="Consolas" panose="020B0609020204030204" pitchFamily="49" charset="0"/>
+              </a:rPr>
+              <a:t>FROM</a:t>
+            </a:r>
+            <a:r>
+              <a:rPr lang="en-IE" dirty="0">
+                <a:latin typeface="Consolas" panose="020B0609020204030204" pitchFamily="49" charset="0"/>
+              </a:rPr>
+              <a:t> races</a:t>
             </a:r>
           </a:p>
           <a:p>
@@ -8095,6 +8305,21 @@
               <a:buNone/>
               <a:tabLst/>
             </a:pPr>
+            <a:r>
+              <a:rPr kumimoji="0" lang="en-IE" sz="3200" b="1" i="0" u="none" strike="noStrike" cap="none" spc="0" normalizeH="0" baseline="0" dirty="0">
+                <a:ln>
+                  <a:noFill/>
+                </a:ln>
+                <a:solidFill>
+                  <a:srgbClr val="00B050"/>
+                </a:solidFill>
+                <a:effectLst/>
+                <a:uFillTx/>
+                <a:latin typeface="Consolas" panose="020B0609020204030204" pitchFamily="49" charset="0"/>
+                <a:sym typeface="Palatino"/>
+              </a:rPr>
+              <a:t>INNER JOIN</a:t>
+            </a:r>
             <a:r>
               <a:rPr kumimoji="0" lang="en-IE" sz="3200" b="0" i="0" u="none" strike="noStrike" cap="none" spc="0" normalizeH="0" baseline="0" dirty="0">
                 <a:ln>
@@ -8108,7 +8333,7 @@
                 <a:latin typeface="Consolas" panose="020B0609020204030204" pitchFamily="49" charset="0"/>
                 <a:sym typeface="Palatino"/>
               </a:rPr>
-              <a:t>INNER JOIN circuits</a:t>
+              <a:t> circuits</a:t>
             </a:r>
           </a:p>
           <a:p>
@@ -8132,7 +8357,22 @@
               <a:rPr lang="en-IE" dirty="0">
                 <a:latin typeface="Consolas" panose="020B0609020204030204" pitchFamily="49" charset="0"/>
               </a:rPr>
-              <a:t>	ON </a:t>
+              <a:t>	</a:t>
+            </a:r>
+            <a:r>
+              <a:rPr lang="en-IE" b="1" dirty="0">
+                <a:solidFill>
+                  <a:srgbClr val="00B050"/>
+                </a:solidFill>
+                <a:latin typeface="Consolas" panose="020B0609020204030204" pitchFamily="49" charset="0"/>
+              </a:rPr>
+              <a:t>ON</a:t>
+            </a:r>
+            <a:r>
+              <a:rPr lang="en-IE" dirty="0">
+                <a:latin typeface="Consolas" panose="020B0609020204030204" pitchFamily="49" charset="0"/>
+              </a:rPr>
+              <a:t> </a:t>
             </a:r>
             <a:r>
               <a:rPr lang="en-IE" dirty="0" err="1">
@@ -8164,6 +8404,21 @@
               <a:buNone/>
               <a:tabLst/>
             </a:pPr>
+            <a:r>
+              <a:rPr kumimoji="0" lang="en-IE" sz="3200" b="1" i="0" u="none" strike="noStrike" cap="none" spc="0" normalizeH="0" baseline="0" dirty="0">
+                <a:ln>
+                  <a:noFill/>
+                </a:ln>
+                <a:solidFill>
+                  <a:srgbClr val="00B050"/>
+                </a:solidFill>
+                <a:effectLst/>
+                <a:uFillTx/>
+                <a:latin typeface="Consolas" panose="020B0609020204030204" pitchFamily="49" charset="0"/>
+                <a:sym typeface="Palatino"/>
+              </a:rPr>
+              <a:t>INNER JOIN </a:t>
+            </a:r>
             <a:r>
               <a:rPr kumimoji="0" lang="en-IE" sz="3200" b="0" i="0" u="none" strike="noStrike" cap="none" spc="0" normalizeH="0" baseline="0" dirty="0">
                 <a:ln>
@@ -8177,7 +8432,7 @@
                 <a:latin typeface="Consolas" panose="020B0609020204030204" pitchFamily="49" charset="0"/>
                 <a:sym typeface="Palatino"/>
               </a:rPr>
-              <a:t>INNER JOIN resul</a:t>
+              <a:t>resul</a:t>
             </a:r>
             <a:r>
               <a:rPr lang="en-IE" dirty="0">
@@ -8216,7 +8471,37 @@
                 <a:latin typeface="Consolas" panose="020B0609020204030204" pitchFamily="49" charset="0"/>
                 <a:sym typeface="Palatino"/>
               </a:rPr>
-              <a:t>	ON </a:t>
+              <a:t>	</a:t>
+            </a:r>
+            <a:r>
+              <a:rPr kumimoji="0" lang="en-IE" sz="3200" b="1" i="0" u="none" strike="noStrike" cap="none" spc="0" normalizeH="0" baseline="0" dirty="0">
+                <a:ln>
+                  <a:noFill/>
+                </a:ln>
+                <a:solidFill>
+                  <a:srgbClr val="00B050"/>
+                </a:solidFill>
+                <a:effectLst/>
+                <a:uFillTx/>
+                <a:latin typeface="Consolas" panose="020B0609020204030204" pitchFamily="49" charset="0"/>
+                <a:sym typeface="Palatino"/>
+              </a:rPr>
+              <a:t>ON</a:t>
+            </a:r>
+            <a:r>
+              <a:rPr kumimoji="0" lang="en-IE" sz="3200" b="0" i="0" u="none" strike="noStrike" cap="none" spc="0" normalizeH="0" baseline="0" dirty="0">
+                <a:ln>
+                  <a:noFill/>
+                </a:ln>
+                <a:solidFill>
+                  <a:srgbClr val="414141"/>
+                </a:solidFill>
+                <a:effectLst/>
+                <a:uFillTx/>
+                <a:latin typeface="Consolas" panose="020B0609020204030204" pitchFamily="49" charset="0"/>
+                <a:sym typeface="Palatino"/>
+              </a:rPr>
+              <a:t> </a:t>
             </a:r>
             <a:r>
               <a:rPr kumimoji="0" lang="en-IE" sz="3200" b="0" i="0" u="none" strike="noStrike" cap="none" spc="0" normalizeH="0" baseline="0" dirty="0" err="1">
@@ -8267,10 +8552,19 @@
               <a:tabLst/>
             </a:pPr>
             <a:r>
+              <a:rPr lang="en-IE" b="1" dirty="0">
+                <a:solidFill>
+                  <a:srgbClr val="00B050"/>
+                </a:solidFill>
+                <a:latin typeface="Consolas" panose="020B0609020204030204" pitchFamily="49" charset="0"/>
+              </a:rPr>
+              <a:t>WHERE</a:t>
+            </a:r>
+            <a:r>
               <a:rPr lang="en-IE" dirty="0">
                 <a:latin typeface="Consolas" panose="020B0609020204030204" pitchFamily="49" charset="0"/>
               </a:rPr>
-              <a:t>WHERE </a:t>
+              <a:t> </a:t>
             </a:r>
             <a:r>
               <a:rPr lang="en-IE" dirty="0" err="1">
@@ -8282,7 +8576,22 @@
               <a:rPr lang="en-IE" dirty="0">
                 <a:latin typeface="Consolas" panose="020B0609020204030204" pitchFamily="49" charset="0"/>
               </a:rPr>
-              <a:t> = ‘Collision’ AND </a:t>
+              <a:t> = ‘Collision’ </a:t>
+            </a:r>
+            <a:r>
+              <a:rPr lang="en-IE" b="1" dirty="0">
+                <a:solidFill>
+                  <a:srgbClr val="00B050"/>
+                </a:solidFill>
+                <a:latin typeface="Consolas" panose="020B0609020204030204" pitchFamily="49" charset="0"/>
+              </a:rPr>
+              <a:t>AND</a:t>
+            </a:r>
+            <a:r>
+              <a:rPr lang="en-IE" dirty="0">
+                <a:latin typeface="Consolas" panose="020B0609020204030204" pitchFamily="49" charset="0"/>
+              </a:rPr>
+              <a:t> </a:t>
             </a:r>
             <a:r>
               <a:rPr lang="en-IE" dirty="0" err="1">
@@ -8315,12 +8624,12 @@
               <a:tabLst/>
             </a:pPr>
             <a:r>
-              <a:rPr kumimoji="0" lang="en-IE" sz="3200" b="0" i="0" u="none" strike="noStrike" cap="none" spc="0" normalizeH="0" baseline="0" dirty="0">
+              <a:rPr kumimoji="0" lang="en-IE" sz="3200" b="1" i="0" u="none" strike="noStrike" cap="none" spc="0" normalizeH="0" baseline="0" dirty="0">
                 <a:ln>
                   <a:noFill/>
                 </a:ln>
                 <a:solidFill>
-                  <a:srgbClr val="414141"/>
+                  <a:srgbClr val="00B050"/>
                 </a:solidFill>
                 <a:effectLst/>
                 <a:uFillTx/>
@@ -8375,17 +8684,35 @@
               <a:tabLst/>
             </a:pPr>
             <a:r>
+              <a:rPr lang="en-IE" b="1" dirty="0">
+                <a:solidFill>
+                  <a:srgbClr val="00B050"/>
+                </a:solidFill>
+                <a:latin typeface="Consolas" panose="020B0609020204030204" pitchFamily="49" charset="0"/>
+              </a:rPr>
+              <a:t>ORDER BY </a:t>
+            </a:r>
+            <a:r>
               <a:rPr lang="en-IE" dirty="0">
                 <a:latin typeface="Consolas" panose="020B0609020204030204" pitchFamily="49" charset="0"/>
               </a:rPr>
-              <a:t>ORDER BY count DESC</a:t>
-            </a:r>
-            <a:endParaRPr kumimoji="0" lang="en-IE" sz="3200" b="0" i="0" u="none" strike="noStrike" cap="none" spc="0" normalizeH="0" baseline="0" dirty="0">
+              <a:t>count </a:t>
+            </a:r>
+            <a:r>
+              <a:rPr lang="en-IE" b="1" dirty="0">
+                <a:solidFill>
+                  <a:srgbClr val="00B050"/>
+                </a:solidFill>
+                <a:latin typeface="Consolas" panose="020B0609020204030204" pitchFamily="49" charset="0"/>
+              </a:rPr>
+              <a:t>DESC</a:t>
+            </a:r>
+            <a:endParaRPr kumimoji="0" lang="en-IE" sz="3200" b="1" i="0" u="none" strike="noStrike" cap="none" spc="0" normalizeH="0" baseline="0" dirty="0">
               <a:ln>
                 <a:noFill/>
               </a:ln>
               <a:solidFill>
-                <a:srgbClr val="414141"/>
+                <a:srgbClr val="00B050"/>
               </a:solidFill>
               <a:effectLst/>
               <a:uFillTx/>
@@ -8427,7 +8754,7 @@
                                     <p:cond delay="0"/>
                                   </p:stCondLst>
                                   <p:childTnLst>
-                                    <p:animMotion origin="layout" path="M -0.02578 1.66667E-6 L -0.20306 -0.2632 " pathEditMode="relative" rAng="0" ptsTypes="AA">
+                                    <p:animMotion origin="layout" path="M -0.02578 -1.48148E-6 L -0.20306 -0.26319 " pathEditMode="relative" rAng="0" ptsTypes="AA">
                                       <p:cBhvr>
                                         <p:cTn id="6" dur="2000" fill="hold"/>
                                         <p:tgtEl>
@@ -8469,7 +8796,7 @@
                                     <p:cond delay="0"/>
                                   </p:stCondLst>
                                   <p:childTnLst>
-                                    <p:animMotion origin="layout" path="M -0.02578 1.66667E-6 L -0.20306 -0.2632 " pathEditMode="relative" rAng="0" ptsTypes="AA">
+                                    <p:animMotion origin="layout" path="M -0.02579 -1.48148E-6 L -0.20306 -0.26319 " pathEditMode="relative" rAng="0" ptsTypes="AA">
                                       <p:cBhvr>
                                         <p:cTn id="10" dur="2000" fill="hold"/>
                                         <p:tgtEl>

</xml_diff>

<commit_message>
correct rel algebra in ppp, added query description
</commit_message>
<xml_diff>
--- a/presentation DBM1.pptx
+++ b/presentation DBM1.pptx
@@ -861,7 +861,7 @@
           <a:lstStyle/>
           <a:p>
             <a:fld id="{86CB4B4D-7CA3-9044-876B-883B54F8677D}" type="slidenum">
-              <a:t>‹#›</a:t>
+              <a:t>‹Nr.›</a:t>
             </a:fld>
             <a:endParaRPr/>
           </a:p>
@@ -996,7 +996,7 @@
           <a:lstStyle/>
           <a:p>
             <a:fld id="{86CB4B4D-7CA3-9044-876B-883B54F8677D}" type="slidenum">
-              <a:t>‹#›</a:t>
+              <a:t>‹Nr.›</a:t>
             </a:fld>
             <a:endParaRPr/>
           </a:p>
@@ -1077,7 +1077,7 @@
           <a:lstStyle/>
           <a:p>
             <a:fld id="{86CB4B4D-7CA3-9044-876B-883B54F8677D}" type="slidenum">
-              <a:t>‹#›</a:t>
+              <a:t>‹Nr.›</a:t>
             </a:fld>
             <a:endParaRPr/>
           </a:p>
@@ -1129,7 +1129,7 @@
           <a:lstStyle/>
           <a:p>
             <a:fld id="{86CB4B4D-7CA3-9044-876B-883B54F8677D}" type="slidenum">
-              <a:t>‹#›</a:t>
+              <a:t>‹Nr.›</a:t>
             </a:fld>
             <a:endParaRPr/>
           </a:p>
@@ -1561,7 +1561,7 @@
           <a:lstStyle/>
           <a:p>
             <a:fld id="{86CB4B4D-7CA3-9044-876B-883B54F8677D}" type="slidenum">
-              <a:t>‹#›</a:t>
+              <a:t>‹Nr.›</a:t>
             </a:fld>
             <a:endParaRPr/>
           </a:p>
@@ -1642,7 +1642,7 @@
           <a:lstStyle/>
           <a:p>
             <a:fld id="{86CB4B4D-7CA3-9044-876B-883B54F8677D}" type="slidenum">
-              <a:t>‹#›</a:t>
+              <a:t>‹Nr.›</a:t>
             </a:fld>
             <a:endParaRPr/>
           </a:p>
@@ -1992,7 +1992,7 @@
           <a:lstStyle/>
           <a:p>
             <a:fld id="{86CB4B4D-7CA3-9044-876B-883B54F8677D}" type="slidenum">
-              <a:t>‹#›</a:t>
+              <a:t>‹Nr.›</a:t>
             </a:fld>
             <a:endParaRPr/>
           </a:p>
@@ -2069,7 +2069,7 @@
           <a:lstStyle/>
           <a:p>
             <a:fld id="{86CB4B4D-7CA3-9044-876B-883B54F8677D}" type="slidenum">
-              <a:t>‹#›</a:t>
+              <a:t>‹Nr.›</a:t>
             </a:fld>
             <a:endParaRPr/>
           </a:p>
@@ -4655,7 +4655,7 @@
           <a:lstStyle/>
           <a:p>
             <a:fld id="{86CB4B4D-7CA3-9044-876B-883B54F8677D}" type="slidenum">
-              <a:t>‹#›</a:t>
+              <a:t>‹Nr.›</a:t>
             </a:fld>
             <a:endParaRPr/>
           </a:p>
@@ -4803,7 +4803,7 @@
           <a:lstStyle/>
           <a:p>
             <a:fld id="{86CB4B4D-7CA3-9044-876B-883B54F8677D}" type="slidenum">
-              <a:t>‹#›</a:t>
+              <a:t>‹Nr.›</a:t>
             </a:fld>
             <a:endParaRPr/>
           </a:p>
@@ -4954,7 +4954,7 @@
           </a:ln>
           <a:extLst>
             <a:ext uri="{C572A759-6A51-4108-AA02-DFA0A04FC94B}">
-              <ma14:wrappingTextBoxFlag xmlns="" xmlns:m="http://schemas.openxmlformats.org/officeDocument/2006/math" xmlns:a14="http://schemas.microsoft.com/office/drawing/2010/main" xmlns:ma14="http://schemas.microsoft.com/office/mac/drawingml/2011/main" val="1"/>
+              <ma14:wrappingTextBoxFlag xmlns:ma14="http://schemas.microsoft.com/office/mac/drawingml/2011/main" xmlns:a14="http://schemas.microsoft.com/office/drawing/2010/main" xmlns:m="http://schemas.openxmlformats.org/officeDocument/2006/math" xmlns="" val="1"/>
             </a:ext>
           </a:extLst>
         </p:spPr>
@@ -4993,7 +4993,7 @@
           </a:ln>
           <a:extLst>
             <a:ext uri="{C572A759-6A51-4108-AA02-DFA0A04FC94B}">
-              <ma14:wrappingTextBoxFlag xmlns="" xmlns:m="http://schemas.openxmlformats.org/officeDocument/2006/math" xmlns:a14="http://schemas.microsoft.com/office/drawing/2010/main" xmlns:ma14="http://schemas.microsoft.com/office/mac/drawingml/2011/main" val="1"/>
+              <ma14:wrappingTextBoxFlag xmlns:ma14="http://schemas.microsoft.com/office/mac/drawingml/2011/main" xmlns:a14="http://schemas.microsoft.com/office/drawing/2010/main" xmlns:m="http://schemas.openxmlformats.org/officeDocument/2006/math" xmlns="" val="1"/>
             </a:ext>
           </a:extLst>
         </p:spPr>
@@ -5070,7 +5070,7 @@
           </a:lstStyle>
           <a:p>
             <a:fld id="{86CB4B4D-7CA3-9044-876B-883B54F8677D}" type="slidenum">
-              <a:t>‹#›</a:t>
+              <a:t>‹Nr.›</a:t>
             </a:fld>
             <a:endParaRPr/>
           </a:p>
@@ -6994,8 +6994,8 @@
           </a:p>
         </p:txBody>
       </p:sp>
-      <mc:AlternateContent xmlns:mc="http://schemas.openxmlformats.org/markup-compatibility/2006" xmlns:a14="http://schemas.microsoft.com/office/drawing/2010/main">
-        <mc:Choice Requires="a14">
+      <mc:AlternateContent xmlns:mc="http://schemas.openxmlformats.org/markup-compatibility/2006">
+        <mc:Choice xmlns:a14="http://schemas.microsoft.com/office/drawing/2010/main" Requires="a14">
           <p:sp>
             <p:nvSpPr>
               <p:cNvPr id="14" name="Textfeld 13">
@@ -7198,6 +7198,22 @@
                       </a:rPr>
                       <m:t>(</m:t>
                     </m:r>
+                    <m:r>
+                      <a:rPr kumimoji="0" lang="de-DE" sz="4400" b="0" i="1" u="none" strike="noStrike" cap="none" spc="0" normalizeH="0" baseline="-25000" smtClean="0">
+                        <a:ln>
+                          <a:noFill/>
+                        </a:ln>
+                        <a:solidFill>
+                          <a:srgbClr val="414141"/>
+                        </a:solidFill>
+                        <a:effectLst/>
+                        <a:uFillTx/>
+                        <a:latin typeface="Cambria Math" panose="02040503050406030204" pitchFamily="18" charset="0"/>
+                        <a:ea typeface="Cambria Math" panose="02040503050406030204" pitchFamily="18" charset="0"/>
+                        <a:sym typeface="Palatino"/>
+                      </a:rPr>
+                      <m:t>𝑠𝑒𝑎𝑠𝑜𝑛</m:t>
+                    </m:r>
                     <m:sSub>
                       <m:sSubPr>
                         <m:ctrlPr>
@@ -7235,38 +7251,6 @@
                         </m:r>
                       </m:e>
                       <m:sub>
-                        <m:r>
-                          <a:rPr kumimoji="0" lang="de-DE" sz="4400" b="0" i="1" u="none" strike="noStrike" cap="none" spc="0" normalizeH="0" baseline="0" smtClean="0">
-                            <a:ln>
-                              <a:noFill/>
-                            </a:ln>
-                            <a:solidFill>
-                              <a:srgbClr val="414141"/>
-                            </a:solidFill>
-                            <a:effectLst/>
-                            <a:uFillTx/>
-                            <a:latin typeface="Cambria Math" panose="02040503050406030204" pitchFamily="18" charset="0"/>
-                            <a:ea typeface="Cambria Math" panose="02040503050406030204" pitchFamily="18" charset="0"/>
-                            <a:sym typeface="Palatino"/>
-                          </a:rPr>
-                          <m:t>𝑠𝑒𝑎𝑠𝑜𝑛</m:t>
-                        </m:r>
-                        <m:r>
-                          <a:rPr kumimoji="0" lang="de-DE" sz="4400" b="0" i="1" u="none" strike="noStrike" cap="none" spc="0" normalizeH="0" baseline="0" smtClean="0">
-                            <a:ln>
-                              <a:noFill/>
-                            </a:ln>
-                            <a:solidFill>
-                              <a:srgbClr val="414141"/>
-                            </a:solidFill>
-                            <a:effectLst/>
-                            <a:uFillTx/>
-                            <a:latin typeface="Cambria Math" panose="02040503050406030204" pitchFamily="18" charset="0"/>
-                            <a:ea typeface="Cambria Math" panose="02040503050406030204" pitchFamily="18" charset="0"/>
-                            <a:sym typeface="Palatino"/>
-                          </a:rPr>
-                          <m:t>,</m:t>
-                        </m:r>
                         <m:r>
                           <a:rPr kumimoji="0" lang="de-DE" sz="4400" b="0" i="1" u="none" strike="noStrike" cap="none" spc="0" normalizeH="0" baseline="0" smtClean="0">
                             <a:ln>
@@ -8073,7 +8057,7 @@
             </p:txBody>
           </p:sp>
         </mc:Choice>
-        <mc:Fallback xmlns="">
+        <mc:Fallback>
           <p:sp>
             <p:nvSpPr>
               <p:cNvPr id="14" name="Textfeld 13">
@@ -8099,7 +8083,7 @@
               <a:blipFill>
                 <a:blip r:embed="rId2"/>
                 <a:stretch>
-                  <a:fillRect/>
+                  <a:fillRect l="-431" r="-62" b="-5579"/>
                 </a:stretch>
               </a:blipFill>
               <a:ln w="12700" cap="flat">
@@ -8113,7 +8097,7 @@
               <a:lstStyle/>
               <a:p>
                 <a:r>
-                  <a:rPr lang="en-IE">
+                  <a:rPr lang="de-DE">
                     <a:noFill/>
                   </a:rPr>
                   <a:t> </a:t>

</xml_diff>